<commit_message>
Deployed 19b36e7 with MkDocs version: 1.5.3
</commit_message>
<xml_diff>
--- a/slides/Unit15_Pointers.pptx
+++ b/slides/Unit15_Pointers.pptx
@@ -5,10 +5,10 @@
     <p:sldMasterId id="2147485087" r:id="rId1"/>
   </p:sldMasterIdLst>
   <p:notesMasterIdLst>
-    <p:notesMasterId r:id="rId13"/>
+    <p:notesMasterId r:id="rId14"/>
   </p:notesMasterIdLst>
   <p:handoutMasterIdLst>
-    <p:handoutMasterId r:id="rId14"/>
+    <p:handoutMasterId r:id="rId15"/>
   </p:handoutMasterIdLst>
   <p:sldIdLst>
     <p:sldId id="256" r:id="rId2"/>
@@ -21,7 +21,8 @@
     <p:sldId id="605" r:id="rId9"/>
     <p:sldId id="591" r:id="rId10"/>
     <p:sldId id="606" r:id="rId11"/>
-    <p:sldId id="607" r:id="rId12"/>
+    <p:sldId id="608" r:id="rId12"/>
+    <p:sldId id="607" r:id="rId13"/>
   </p:sldIdLst>
   <p:sldSz cx="9144000" cy="6858000" type="screen4x3"/>
   <p:notesSz cx="7010400" cy="9296400"/>
@@ -186,7 +187,7 @@
 <file path=ppt/revisionInfo.xml><?xml version="1.0" encoding="utf-8"?>
 <p1510:revInfo xmlns:a="http://schemas.openxmlformats.org/drawingml/2006/main" xmlns:r="http://schemas.openxmlformats.org/officeDocument/2006/relationships" xmlns:p1510="http://schemas.microsoft.com/office/powerpoint/2015/10/main">
   <p1510:revLst>
-    <p1510:client id="{D1FECC8C-C819-4708-B1AC-1A3AF3563654}" v="1159" dt="2024-03-08T09:32:40.039"/>
+    <p1510:client id="{D1FECC8C-C819-4708-B1AC-1A3AF3563654}" v="1309" dt="2024-03-12T01:37:41.234"/>
   </p1510:revLst>
 </p1510:revInfo>
 </file>
@@ -1810,7 +1811,7 @@
   <pc:docChgLst>
     <pc:chgData name="Zhao Jin" userId="cd05a825-544c-438a-9ba1-08e63db50b47" providerId="ADAL" clId="{D1FECC8C-C819-4708-B1AC-1A3AF3563654}"/>
     <pc:docChg chg="undo redo custSel addSld delSld modSld sldOrd">
-      <pc:chgData name="Zhao Jin" userId="cd05a825-544c-438a-9ba1-08e63db50b47" providerId="ADAL" clId="{D1FECC8C-C819-4708-B1AC-1A3AF3563654}" dt="2024-03-08T09:32:40.039" v="2613" actId="20577"/>
+      <pc:chgData name="Zhao Jin" userId="cd05a825-544c-438a-9ba1-08e63db50b47" providerId="ADAL" clId="{D1FECC8C-C819-4708-B1AC-1A3AF3563654}" dt="2024-03-12T01:37:58.416" v="3034" actId="20577"/>
       <pc:docMkLst>
         <pc:docMk/>
       </pc:docMkLst>
@@ -1838,7 +1839,7 @@
         </pc:spChg>
       </pc:sldChg>
       <pc:sldChg chg="addSp delSp modSp mod delAnim modAnim">
-        <pc:chgData name="Zhao Jin" userId="cd05a825-544c-438a-9ba1-08e63db50b47" providerId="ADAL" clId="{D1FECC8C-C819-4708-B1AC-1A3AF3563654}" dt="2024-03-08T08:55:11.366" v="1234" actId="20577"/>
+        <pc:chgData name="Zhao Jin" userId="cd05a825-544c-438a-9ba1-08e63db50b47" providerId="ADAL" clId="{D1FECC8C-C819-4708-B1AC-1A3AF3563654}" dt="2024-03-12T01:13:57.555" v="2875" actId="478"/>
         <pc:sldMkLst>
           <pc:docMk/>
           <pc:sldMk cId="1427618944" sldId="553"/>
@@ -1859,6 +1860,22 @@
             <ac:spMk id="3" creationId="{089DF46C-9E73-4DDA-B367-1A5958BC44BA}"/>
           </ac:spMkLst>
         </pc:spChg>
+        <pc:spChg chg="add del mod">
+          <ac:chgData name="Zhao Jin" userId="cd05a825-544c-438a-9ba1-08e63db50b47" providerId="ADAL" clId="{D1FECC8C-C819-4708-B1AC-1A3AF3563654}" dt="2024-03-12T01:08:34.187" v="2654" actId="478"/>
+          <ac:spMkLst>
+            <pc:docMk/>
+            <pc:sldMk cId="1427618944" sldId="553"/>
+            <ac:spMk id="6" creationId="{09763D9E-B0A3-6B55-DC89-6A696F030DDC}"/>
+          </ac:spMkLst>
+        </pc:spChg>
+        <pc:spChg chg="add del mod">
+          <ac:chgData name="Zhao Jin" userId="cd05a825-544c-438a-9ba1-08e63db50b47" providerId="ADAL" clId="{D1FECC8C-C819-4708-B1AC-1A3AF3563654}" dt="2024-03-12T01:09:41.099" v="2691" actId="478"/>
+          <ac:spMkLst>
+            <pc:docMk/>
+            <pc:sldMk cId="1427618944" sldId="553"/>
+            <ac:spMk id="7" creationId="{AA81408B-EF12-BB79-A252-B4D75D069059}"/>
+          </ac:spMkLst>
+        </pc:spChg>
         <pc:spChg chg="add mod">
           <ac:chgData name="Zhao Jin" userId="cd05a825-544c-438a-9ba1-08e63db50b47" providerId="ADAL" clId="{D1FECC8C-C819-4708-B1AC-1A3AF3563654}" dt="2024-03-08T07:52:12.868" v="71" actId="767"/>
           <ac:spMkLst>
@@ -1868,13 +1885,29 @@
           </ac:spMkLst>
         </pc:spChg>
         <pc:spChg chg="mod">
-          <ac:chgData name="Zhao Jin" userId="cd05a825-544c-438a-9ba1-08e63db50b47" providerId="ADAL" clId="{D1FECC8C-C819-4708-B1AC-1A3AF3563654}" dt="2024-03-08T07:56:10.778" v="261" actId="20577"/>
+          <ac:chgData name="Zhao Jin" userId="cd05a825-544c-438a-9ba1-08e63db50b47" providerId="ADAL" clId="{D1FECC8C-C819-4708-B1AC-1A3AF3563654}" dt="2024-03-12T01:07:46.723" v="2647"/>
           <ac:spMkLst>
             <pc:docMk/>
             <pc:sldMk cId="1427618944" sldId="553"/>
             <ac:spMk id="8" creationId="{00000000-0000-0000-0000-000000000000}"/>
           </ac:spMkLst>
         </pc:spChg>
+        <pc:spChg chg="add del mod">
+          <ac:chgData name="Zhao Jin" userId="cd05a825-544c-438a-9ba1-08e63db50b47" providerId="ADAL" clId="{D1FECC8C-C819-4708-B1AC-1A3AF3563654}" dt="2024-03-12T01:09:25.747" v="2676" actId="478"/>
+          <ac:spMkLst>
+            <pc:docMk/>
+            <pc:sldMk cId="1427618944" sldId="553"/>
+            <ac:spMk id="10" creationId="{9FFA4FE4-D216-8FA7-76D9-F9685635A781}"/>
+          </ac:spMkLst>
+        </pc:spChg>
+        <pc:spChg chg="add del mod">
+          <ac:chgData name="Zhao Jin" userId="cd05a825-544c-438a-9ba1-08e63db50b47" providerId="ADAL" clId="{D1FECC8C-C819-4708-B1AC-1A3AF3563654}" dt="2024-03-12T01:11:01.335" v="2768" actId="478"/>
+          <ac:spMkLst>
+            <pc:docMk/>
+            <pc:sldMk cId="1427618944" sldId="553"/>
+            <ac:spMk id="12" creationId="{1C364928-0469-4BB8-CC95-A1956C05366D}"/>
+          </ac:spMkLst>
+        </pc:spChg>
         <pc:spChg chg="del">
           <ac:chgData name="Zhao Jin" userId="cd05a825-544c-438a-9ba1-08e63db50b47" providerId="ADAL" clId="{D1FECC8C-C819-4708-B1AC-1A3AF3563654}" dt="2024-03-08T07:52:44.831" v="74" actId="478"/>
           <ac:spMkLst>
@@ -1883,16 +1916,32 @@
             <ac:spMk id="13" creationId="{4DA699A6-CA2F-4E98-B1C9-75406EBE16BD}"/>
           </ac:spMkLst>
         </pc:spChg>
-        <pc:spChg chg="mod">
-          <ac:chgData name="Zhao Jin" userId="cd05a825-544c-438a-9ba1-08e63db50b47" providerId="ADAL" clId="{D1FECC8C-C819-4708-B1AC-1A3AF3563654}" dt="2024-03-08T08:55:11.366" v="1234" actId="20577"/>
+        <pc:spChg chg="add mod">
+          <ac:chgData name="Zhao Jin" userId="cd05a825-544c-438a-9ba1-08e63db50b47" providerId="ADAL" clId="{D1FECC8C-C819-4708-B1AC-1A3AF3563654}" dt="2024-03-12T01:12:28.975" v="2827" actId="1038"/>
+          <ac:spMkLst>
+            <pc:docMk/>
+            <pc:sldMk cId="1427618944" sldId="553"/>
+            <ac:spMk id="13" creationId="{FC077A5E-41FC-9410-4B41-47E92F472305}"/>
+          </ac:spMkLst>
+        </pc:spChg>
+        <pc:spChg chg="mod">
+          <ac:chgData name="Zhao Jin" userId="cd05a825-544c-438a-9ba1-08e63db50b47" providerId="ADAL" clId="{D1FECC8C-C819-4708-B1AC-1A3AF3563654}" dt="2024-03-12T01:12:28.975" v="2827" actId="1038"/>
           <ac:spMkLst>
             <pc:docMk/>
             <pc:sldMk cId="1427618944" sldId="553"/>
             <ac:spMk id="15" creationId="{B7B276B3-8690-4038-BB33-E9C6A2F36099}"/>
           </ac:spMkLst>
         </pc:spChg>
+        <pc:spChg chg="add del mod">
+          <ac:chgData name="Zhao Jin" userId="cd05a825-544c-438a-9ba1-08e63db50b47" providerId="ADAL" clId="{D1FECC8C-C819-4708-B1AC-1A3AF3563654}" dt="2024-03-12T01:13:57.555" v="2875" actId="478"/>
+          <ac:spMkLst>
+            <pc:docMk/>
+            <pc:sldMk cId="1427618944" sldId="553"/>
+            <ac:spMk id="16" creationId="{19AA7082-E69C-1593-CDD8-44A1B1011DD7}"/>
+          </ac:spMkLst>
+        </pc:spChg>
         <pc:spChg chg="add mod">
-          <ac:chgData name="Zhao Jin" userId="cd05a825-544c-438a-9ba1-08e63db50b47" providerId="ADAL" clId="{D1FECC8C-C819-4708-B1AC-1A3AF3563654}" dt="2024-03-08T07:56:27.671" v="282" actId="1035"/>
+          <ac:chgData name="Zhao Jin" userId="cd05a825-544c-438a-9ba1-08e63db50b47" providerId="ADAL" clId="{D1FECC8C-C819-4708-B1AC-1A3AF3563654}" dt="2024-03-12T01:12:28.975" v="2827" actId="1038"/>
           <ac:spMkLst>
             <pc:docMk/>
             <pc:sldMk cId="1427618944" sldId="553"/>
@@ -1900,7 +1949,7 @@
           </ac:spMkLst>
         </pc:spChg>
         <pc:spChg chg="add mod">
-          <ac:chgData name="Zhao Jin" userId="cd05a825-544c-438a-9ba1-08e63db50b47" providerId="ADAL" clId="{D1FECC8C-C819-4708-B1AC-1A3AF3563654}" dt="2024-03-08T07:56:27.671" v="282" actId="1035"/>
+          <ac:chgData name="Zhao Jin" userId="cd05a825-544c-438a-9ba1-08e63db50b47" providerId="ADAL" clId="{D1FECC8C-C819-4708-B1AC-1A3AF3563654}" dt="2024-03-12T01:12:28.975" v="2827" actId="1038"/>
           <ac:spMkLst>
             <pc:docMk/>
             <pc:sldMk cId="1427618944" sldId="553"/>
@@ -1908,7 +1957,7 @@
           </ac:spMkLst>
         </pc:spChg>
         <pc:spChg chg="add mod">
-          <ac:chgData name="Zhao Jin" userId="cd05a825-544c-438a-9ba1-08e63db50b47" providerId="ADAL" clId="{D1FECC8C-C819-4708-B1AC-1A3AF3563654}" dt="2024-03-08T07:56:27.671" v="282" actId="1035"/>
+          <ac:chgData name="Zhao Jin" userId="cd05a825-544c-438a-9ba1-08e63db50b47" providerId="ADAL" clId="{D1FECC8C-C819-4708-B1AC-1A3AF3563654}" dt="2024-03-12T01:12:28.975" v="2827" actId="1038"/>
           <ac:spMkLst>
             <pc:docMk/>
             <pc:sldMk cId="1427618944" sldId="553"/>
@@ -1916,13 +1965,21 @@
           </ac:spMkLst>
         </pc:spChg>
         <pc:spChg chg="add mod">
-          <ac:chgData name="Zhao Jin" userId="cd05a825-544c-438a-9ba1-08e63db50b47" providerId="ADAL" clId="{D1FECC8C-C819-4708-B1AC-1A3AF3563654}" dt="2024-03-08T07:56:27.671" v="282" actId="1035"/>
+          <ac:chgData name="Zhao Jin" userId="cd05a825-544c-438a-9ba1-08e63db50b47" providerId="ADAL" clId="{D1FECC8C-C819-4708-B1AC-1A3AF3563654}" dt="2024-03-12T01:12:28.975" v="2827" actId="1038"/>
           <ac:spMkLst>
             <pc:docMk/>
             <pc:sldMk cId="1427618944" sldId="553"/>
             <ac:spMk id="27" creationId="{91B52B20-C3CA-042A-69D4-595A34665326}"/>
           </ac:spMkLst>
         </pc:spChg>
+        <pc:picChg chg="add mod">
+          <ac:chgData name="Zhao Jin" userId="cd05a825-544c-438a-9ba1-08e63db50b47" providerId="ADAL" clId="{D1FECC8C-C819-4708-B1AC-1A3AF3563654}" dt="2024-03-12T01:07:29.688" v="2618" actId="1076"/>
+          <ac:picMkLst>
+            <pc:docMk/>
+            <pc:sldMk cId="1427618944" sldId="553"/>
+            <ac:picMk id="3" creationId="{AE5F8B66-A536-5EF0-E189-60C87A7FD2DB}"/>
+          </ac:picMkLst>
+        </pc:picChg>
         <pc:picChg chg="del mod modCrop">
           <ac:chgData name="Zhao Jin" userId="cd05a825-544c-438a-9ba1-08e63db50b47" providerId="ADAL" clId="{D1FECC8C-C819-4708-B1AC-1A3AF3563654}" dt="2024-03-08T07:54:32.171" v="116" actId="478"/>
           <ac:picMkLst>
@@ -1932,7 +1989,7 @@
           </ac:picMkLst>
         </pc:picChg>
         <pc:picChg chg="add mod modCrop">
-          <ac:chgData name="Zhao Jin" userId="cd05a825-544c-438a-9ba1-08e63db50b47" providerId="ADAL" clId="{D1FECC8C-C819-4708-B1AC-1A3AF3563654}" dt="2024-03-08T07:56:27.671" v="282" actId="1035"/>
+          <ac:chgData name="Zhao Jin" userId="cd05a825-544c-438a-9ba1-08e63db50b47" providerId="ADAL" clId="{D1FECC8C-C819-4708-B1AC-1A3AF3563654}" dt="2024-03-12T01:12:28.975" v="2827" actId="1038"/>
           <ac:picMkLst>
             <pc:docMk/>
             <pc:sldMk cId="1427618944" sldId="553"/>
@@ -1956,7 +2013,7 @@
           </ac:cxnSpMkLst>
         </pc:cxnChg>
         <pc:cxnChg chg="add mod">
-          <ac:chgData name="Zhao Jin" userId="cd05a825-544c-438a-9ba1-08e63db50b47" providerId="ADAL" clId="{D1FECC8C-C819-4708-B1AC-1A3AF3563654}" dt="2024-03-08T07:56:27.671" v="282" actId="1035"/>
+          <ac:chgData name="Zhao Jin" userId="cd05a825-544c-438a-9ba1-08e63db50b47" providerId="ADAL" clId="{D1FECC8C-C819-4708-B1AC-1A3AF3563654}" dt="2024-03-12T01:12:28.975" v="2827" actId="1038"/>
           <ac:cxnSpMkLst>
             <pc:docMk/>
             <pc:sldMk cId="1427618944" sldId="553"/>
@@ -1964,7 +2021,7 @@
           </ac:cxnSpMkLst>
         </pc:cxnChg>
         <pc:cxnChg chg="mod ord">
-          <ac:chgData name="Zhao Jin" userId="cd05a825-544c-438a-9ba1-08e63db50b47" providerId="ADAL" clId="{D1FECC8C-C819-4708-B1AC-1A3AF3563654}" dt="2024-03-08T07:56:27.671" v="282" actId="1035"/>
+          <ac:chgData name="Zhao Jin" userId="cd05a825-544c-438a-9ba1-08e63db50b47" providerId="ADAL" clId="{D1FECC8C-C819-4708-B1AC-1A3AF3563654}" dt="2024-03-12T01:12:28.975" v="2827" actId="1038"/>
           <ac:cxnSpMkLst>
             <pc:docMk/>
             <pc:sldMk cId="1427618944" sldId="553"/>
@@ -1980,7 +2037,7 @@
           </ac:cxnSpMkLst>
         </pc:cxnChg>
         <pc:cxnChg chg="add mod">
-          <ac:chgData name="Zhao Jin" userId="cd05a825-544c-438a-9ba1-08e63db50b47" providerId="ADAL" clId="{D1FECC8C-C819-4708-B1AC-1A3AF3563654}" dt="2024-03-08T07:56:27.671" v="282" actId="1035"/>
+          <ac:chgData name="Zhao Jin" userId="cd05a825-544c-438a-9ba1-08e63db50b47" providerId="ADAL" clId="{D1FECC8C-C819-4708-B1AC-1A3AF3563654}" dt="2024-03-12T01:12:28.975" v="2827" actId="1038"/>
           <ac:cxnSpMkLst>
             <pc:docMk/>
             <pc:sldMk cId="1427618944" sldId="553"/>
@@ -2131,7 +2188,7 @@
         </pc:spChg>
       </pc:sldChg>
       <pc:sldChg chg="addSp delSp modSp mod modAnim">
-        <pc:chgData name="Zhao Jin" userId="cd05a825-544c-438a-9ba1-08e63db50b47" providerId="ADAL" clId="{D1FECC8C-C819-4708-B1AC-1A3AF3563654}" dt="2024-03-08T08:13:46.337" v="699" actId="20577"/>
+        <pc:chgData name="Zhao Jin" userId="cd05a825-544c-438a-9ba1-08e63db50b47" providerId="ADAL" clId="{D1FECC8C-C819-4708-B1AC-1A3AF3563654}" dt="2024-03-12T01:35:11.379" v="2876"/>
         <pc:sldMkLst>
           <pc:docMk/>
           <pc:sldMk cId="2889169307" sldId="601"/>
@@ -2209,7 +2266,7 @@
         </pc:spChg>
       </pc:sldChg>
       <pc:sldChg chg="addSp delSp modSp add mod modAnim">
-        <pc:chgData name="Zhao Jin" userId="cd05a825-544c-438a-9ba1-08e63db50b47" providerId="ADAL" clId="{D1FECC8C-C819-4708-B1AC-1A3AF3563654}" dt="2024-03-08T09:22:24.047" v="2354" actId="5793"/>
+        <pc:chgData name="Zhao Jin" userId="cd05a825-544c-438a-9ba1-08e63db50b47" providerId="ADAL" clId="{D1FECC8C-C819-4708-B1AC-1A3AF3563654}" dt="2024-03-12T01:37:58.416" v="3034" actId="20577"/>
         <pc:sldMkLst>
           <pc:docMk/>
           <pc:sldMk cId="3444732307" sldId="606"/>
@@ -2231,7 +2288,7 @@
           </ac:spMkLst>
         </pc:spChg>
         <pc:spChg chg="mod">
-          <ac:chgData name="Zhao Jin" userId="cd05a825-544c-438a-9ba1-08e63db50b47" providerId="ADAL" clId="{D1FECC8C-C819-4708-B1AC-1A3AF3563654}" dt="2024-03-08T09:22:24.047" v="2354" actId="5793"/>
+          <ac:chgData name="Zhao Jin" userId="cd05a825-544c-438a-9ba1-08e63db50b47" providerId="ADAL" clId="{D1FECC8C-C819-4708-B1AC-1A3AF3563654}" dt="2024-03-12T01:37:41.234" v="3020" actId="20577"/>
           <ac:spMkLst>
             <pc:docMk/>
             <pc:sldMk cId="3444732307" sldId="606"/>
@@ -2287,7 +2344,7 @@
           </ac:spMkLst>
         </pc:spChg>
         <pc:spChg chg="mod">
-          <ac:chgData name="Zhao Jin" userId="cd05a825-544c-438a-9ba1-08e63db50b47" providerId="ADAL" clId="{D1FECC8C-C819-4708-B1AC-1A3AF3563654}" dt="2024-03-08T09:00:44.108" v="1487" actId="20577"/>
+          <ac:chgData name="Zhao Jin" userId="cd05a825-544c-438a-9ba1-08e63db50b47" providerId="ADAL" clId="{D1FECC8C-C819-4708-B1AC-1A3AF3563654}" dt="2024-03-12T01:37:58.416" v="3034" actId="20577"/>
           <ac:spMkLst>
             <pc:docMk/>
             <pc:sldMk cId="3444732307" sldId="606"/>
@@ -2633,6 +2690,21 @@
             <pc:docMk/>
             <pc:sldMk cId="3198546536" sldId="607"/>
             <ac:spMk id="14338" creationId="{A596C5FA-E94B-03AE-A6A0-66C6D4ECA719}"/>
+          </ac:spMkLst>
+        </pc:spChg>
+      </pc:sldChg>
+      <pc:sldChg chg="modSp add modAnim">
+        <pc:chgData name="Zhao Jin" userId="cd05a825-544c-438a-9ba1-08e63db50b47" providerId="ADAL" clId="{D1FECC8C-C819-4708-B1AC-1A3AF3563654}" dt="2024-03-12T01:36:34.978" v="2879" actId="20577"/>
+        <pc:sldMkLst>
+          <pc:docMk/>
+          <pc:sldMk cId="190401359" sldId="608"/>
+        </pc:sldMkLst>
+        <pc:spChg chg="mod">
+          <ac:chgData name="Zhao Jin" userId="cd05a825-544c-438a-9ba1-08e63db50b47" providerId="ADAL" clId="{D1FECC8C-C819-4708-B1AC-1A3AF3563654}" dt="2024-03-12T01:36:33.008" v="2878" actId="20577"/>
+          <ac:spMkLst>
+            <pc:docMk/>
+            <pc:sldMk cId="190401359" sldId="608"/>
+            <ac:spMk id="9" creationId="{269DAB42-C589-5BFA-8DDD-6B3F03E9F33D}"/>
           </ac:spMkLst>
         </pc:spChg>
       </pc:sldChg>
@@ -9125,7 +9197,7 @@
               <a:pPr>
                 <a:defRPr/>
               </a:pPr>
-              <a:t>3/8/2024</a:t>
+              <a:t>3/12/2024</a:t>
             </a:fld>
             <a:endParaRPr lang="en-US" dirty="0"/>
           </a:p>
@@ -9594,6 +9666,147 @@
 </file>
 
 <file path=ppt/notesSlides/notesSlide11.xml><?xml version="1.0" encoding="utf-8"?>
+<p:notes xmlns:a="http://schemas.openxmlformats.org/drawingml/2006/main" xmlns:r="http://schemas.openxmlformats.org/officeDocument/2006/relationships" xmlns:p="http://schemas.openxmlformats.org/presentationml/2006/main">
+  <p:cSld>
+    <p:spTree>
+      <p:nvGrpSpPr>
+        <p:cNvPr id="1" name="">
+          <a:extLst>
+            <a:ext uri="{FF2B5EF4-FFF2-40B4-BE49-F238E27FC236}">
+              <a16:creationId xmlns:a16="http://schemas.microsoft.com/office/drawing/2014/main" id="{BCC0CB90-252B-F726-8EFA-B4DF7FCEE0A0}"/>
+            </a:ext>
+          </a:extLst>
+        </p:cNvPr>
+        <p:cNvGrpSpPr/>
+        <p:nvPr/>
+      </p:nvGrpSpPr>
+      <p:grpSpPr>
+        <a:xfrm>
+          <a:off x="0" y="0"/>
+          <a:ext cx="0" cy="0"/>
+          <a:chOff x="0" y="0"/>
+          <a:chExt cx="0" cy="0"/>
+        </a:xfrm>
+      </p:grpSpPr>
+      <p:sp>
+        <p:nvSpPr>
+          <p:cNvPr id="64514" name="Rectangle 2">
+            <a:extLst>
+              <a:ext uri="{FF2B5EF4-FFF2-40B4-BE49-F238E27FC236}">
+                <a16:creationId xmlns:a16="http://schemas.microsoft.com/office/drawing/2014/main" id="{A672B2AB-1E0F-F8EC-FC78-E3BEB662B7F5}"/>
+              </a:ext>
+            </a:extLst>
+          </p:cNvPr>
+          <p:cNvSpPr>
+            <a:spLocks noGrp="1" noChangeArrowheads="1"/>
+          </p:cNvSpPr>
+          <p:nvPr>
+            <p:ph type="hdr" sz="quarter"/>
+          </p:nvPr>
+        </p:nvSpPr>
+        <p:spPr bwMode="auto">
+          <a:xfrm>
+            <a:off x="0" y="0"/>
+            <a:ext cx="3038786" cy="465341"/>
+          </a:xfrm>
+          <a:noFill/>
+          <a:ln>
+            <a:miter lim="800000"/>
+            <a:headEnd/>
+            <a:tailEnd/>
+          </a:ln>
+        </p:spPr>
+        <p:txBody>
+          <a:bodyPr wrap="square" numCol="1" anchor="t" anchorCtr="0" compatLnSpc="1">
+            <a:prstTxWarp prst="textNoShape">
+              <a:avLst/>
+            </a:prstTxWarp>
+          </a:bodyPr>
+          <a:lstStyle/>
+          <a:p>
+            <a:r>
+              <a:rPr lang="en-US"/>
+              <a:t>CS1010 Programming Methodology</a:t>
+            </a:r>
+          </a:p>
+        </p:txBody>
+      </p:sp>
+      <p:sp>
+        <p:nvSpPr>
+          <p:cNvPr id="64515" name="Rectangle 2">
+            <a:extLst>
+              <a:ext uri="{FF2B5EF4-FFF2-40B4-BE49-F238E27FC236}">
+                <a16:creationId xmlns:a16="http://schemas.microsoft.com/office/drawing/2014/main" id="{888B3579-394B-9DFC-CD3F-77B26E177DEF}"/>
+              </a:ext>
+            </a:extLst>
+          </p:cNvPr>
+          <p:cNvSpPr>
+            <a:spLocks noGrp="1" noRot="1" noChangeAspect="1" noChangeArrowheads="1" noTextEdit="1"/>
+          </p:cNvSpPr>
+          <p:nvPr>
+            <p:ph type="sldImg"/>
+          </p:nvPr>
+        </p:nvSpPr>
+        <p:spPr bwMode="auto">
+          <a:xfrm>
+            <a:off x="1182688" y="696913"/>
+            <a:ext cx="4648200" cy="3486150"/>
+          </a:xfrm>
+          <a:noFill/>
+          <a:ln>
+            <a:solidFill>
+              <a:srgbClr val="000000"/>
+            </a:solidFill>
+            <a:miter lim="800000"/>
+            <a:headEnd/>
+            <a:tailEnd/>
+          </a:ln>
+        </p:spPr>
+      </p:sp>
+      <p:sp>
+        <p:nvSpPr>
+          <p:cNvPr id="64516" name="Rectangle 3">
+            <a:extLst>
+              <a:ext uri="{FF2B5EF4-FFF2-40B4-BE49-F238E27FC236}">
+                <a16:creationId xmlns:a16="http://schemas.microsoft.com/office/drawing/2014/main" id="{79E49AAE-3ECB-018B-8614-198118BEB698}"/>
+              </a:ext>
+            </a:extLst>
+          </p:cNvPr>
+          <p:cNvSpPr>
+            <a:spLocks noGrp="1" noChangeArrowheads="1"/>
+          </p:cNvSpPr>
+          <p:nvPr>
+            <p:ph type="body" idx="1"/>
+          </p:nvPr>
+        </p:nvSpPr>
+        <p:spPr>
+          <a:ln w="9525"/>
+        </p:spPr>
+        <p:txBody>
+          <a:bodyPr/>
+          <a:lstStyle/>
+          <a:p>
+            <a:pPr eaLnBrk="1" hangingPunct="1">
+              <a:defRPr/>
+            </a:pPr>
+            <a:endParaRPr lang="en-US" dirty="0"/>
+          </a:p>
+        </p:txBody>
+      </p:sp>
+    </p:spTree>
+    <p:extLst>
+      <p:ext uri="{BB962C8B-B14F-4D97-AF65-F5344CB8AC3E}">
+        <p14:creationId xmlns:p14="http://schemas.microsoft.com/office/powerpoint/2010/main" val="273284557"/>
+      </p:ext>
+    </p:extLst>
+  </p:cSld>
+  <p:clrMapOvr>
+    <a:masterClrMapping/>
+  </p:clrMapOvr>
+</p:notes>
+</file>
+
+<file path=ppt/notesSlides/notesSlide12.xml><?xml version="1.0" encoding="utf-8"?>
 <p:notes xmlns:a="http://schemas.openxmlformats.org/drawingml/2006/main" xmlns:r="http://schemas.openxmlformats.org/officeDocument/2006/relationships" xmlns:p="http://schemas.openxmlformats.org/presentationml/2006/main">
   <p:cSld>
     <p:spTree>
@@ -14560,20 +14773,12 @@
           <a:p>
             <a:pPr eaLnBrk="1" hangingPunct="1"/>
             <a:r>
-              <a:rPr lang="en-GB" sz="3600" dirty="0">
+              <a:rPr lang="en-GB" sz="3600">
                 <a:solidFill>
                   <a:srgbClr val="0000FF"/>
                 </a:solidFill>
               </a:rPr>
-              <a:t>Pointer </a:t>
-            </a:r>
-            <a:r>
-              <a:rPr lang="en-GB" sz="3600" dirty="0" err="1">
-                <a:solidFill>
-                  <a:srgbClr val="0000FF"/>
-                </a:solidFill>
-              </a:rPr>
-              <a:t>Arithmetics</a:t>
+              <a:t>Pop Quiz</a:t>
             </a:r>
             <a:endParaRPr lang="en-GB" sz="3600" dirty="0">
               <a:solidFill>
@@ -14628,7 +14833,7 @@
             </a:pPr>
             <a:r>
               <a:rPr lang="en-US" sz="2800" dirty="0"/>
-              <a:t>What is the result of </a:t>
+              <a:t>What is the result of *</a:t>
             </a:r>
             <a:r>
               <a:rPr lang="en-US" sz="2800" dirty="0" err="1"/>
@@ -14710,15 +14915,23 @@
             </a:pPr>
             <a:r>
               <a:rPr lang="en-US" dirty="0"/>
-              <a:t>Adding 1 to a pointer itself gives the address of </a:t>
-            </a:r>
-            <a:r>
-              <a:rPr lang="en-US" b="1" dirty="0"/>
-              <a:t>the size of the variable pointed to by the pointer</a:t>
+              <a:t>*</a:t>
+            </a:r>
+            <a:r>
+              <a:rPr lang="en-US" dirty="0" err="1"/>
+              <a:t>ptr</a:t>
             </a:r>
             <a:r>
               <a:rPr lang="en-US" dirty="0"/>
-              <a:t>.</a:t>
+              <a:t> is equivalent to x, so *</a:t>
+            </a:r>
+            <a:r>
+              <a:rPr lang="en-US" dirty="0" err="1"/>
+              <a:t>ptr</a:t>
+            </a:r>
+            <a:r>
+              <a:rPr lang="en-US" dirty="0"/>
+              <a:t> + 1 is 2!</a:t>
             </a:r>
           </a:p>
           <a:p>
@@ -14757,11 +14970,19 @@
             </a:pPr>
             <a:r>
               <a:rPr lang="en-US" dirty="0"/>
-              <a:t>If x is at location 1000 and a long variable takes up 8 bytes…</a:t>
-            </a:r>
-          </a:p>
-          <a:p>
-            <a:pPr marL="621983" lvl="1" indent="-347663">
+              <a:t>But how about </a:t>
+            </a:r>
+            <a:r>
+              <a:rPr lang="en-US" dirty="0" err="1"/>
+              <a:t>ptr</a:t>
+            </a:r>
+            <a:r>
+              <a:rPr lang="en-US" dirty="0"/>
+              <a:t> + 1?</a:t>
+            </a:r>
+          </a:p>
+          <a:p>
+            <a:pPr marL="347663" indent="-347663">
               <a:spcBef>
                 <a:spcPts val="600"/>
               </a:spcBef>
@@ -14776,39 +14997,7 @@
               <a:buChar char="§"/>
               <a:defRPr/>
             </a:pPr>
-            <a:r>
-              <a:rPr lang="en-US" dirty="0" err="1"/>
-              <a:t>ptr</a:t>
-            </a:r>
-            <a:r>
-              <a:rPr lang="en-US" dirty="0"/>
-              <a:t> is 1000.</a:t>
-            </a:r>
-          </a:p>
-          <a:p>
-            <a:pPr marL="621983" lvl="1" indent="-347663">
-              <a:spcBef>
-                <a:spcPts val="600"/>
-              </a:spcBef>
-              <a:buClr>
-                <a:schemeClr val="tx1">
-                  <a:lumMod val="90000"/>
-                  <a:lumOff val="10000"/>
-                </a:schemeClr>
-              </a:buClr>
-              <a:buSzPct val="100000"/>
-              <a:buFont typeface="Wingdings" panose="05000000000000000000" pitchFamily="2" charset="2"/>
-              <a:buChar char="§"/>
-              <a:defRPr/>
-            </a:pPr>
-            <a:r>
-              <a:rPr lang="en-US" dirty="0" err="1"/>
-              <a:t>ptr</a:t>
-            </a:r>
-            <a:r>
-              <a:rPr lang="en-US" dirty="0"/>
-              <a:t> + 1 is 1008.</a:t>
-            </a:r>
+            <a:endParaRPr lang="en-US" dirty="0"/>
           </a:p>
           <a:p>
             <a:pPr marL="347663" indent="-347663">
@@ -15109,6 +15298,748 @@
     <p:extLst>
       <p:ext uri="{BB962C8B-B14F-4D97-AF65-F5344CB8AC3E}">
         <p14:creationId xmlns:p14="http://schemas.microsoft.com/office/powerpoint/2010/main" val="3444732307"/>
+      </p:ext>
+    </p:extLst>
+  </p:cSld>
+  <p:clrMapOvr>
+    <a:masterClrMapping/>
+  </p:clrMapOvr>
+  <p:transition>
+    <p:fade/>
+  </p:transition>
+  <p:timing>
+    <p:tnLst>
+      <p:par>
+        <p:cTn id="1" dur="indefinite" restart="never" nodeType="tmRoot">
+          <p:childTnLst>
+            <p:seq concurrent="1" nextAc="seek">
+              <p:cTn id="2" dur="indefinite" nodeType="mainSeq">
+                <p:childTnLst>
+                  <p:par>
+                    <p:cTn id="3" fill="hold">
+                      <p:stCondLst>
+                        <p:cond delay="indefinite"/>
+                      </p:stCondLst>
+                      <p:childTnLst>
+                        <p:par>
+                          <p:cTn id="4" fill="hold">
+                            <p:stCondLst>
+                              <p:cond delay="0"/>
+                            </p:stCondLst>
+                            <p:childTnLst>
+                              <p:par>
+                                <p:cTn id="5" presetID="1" presetClass="entr" presetSubtype="0" fill="hold" nodeType="clickEffect">
+                                  <p:stCondLst>
+                                    <p:cond delay="0"/>
+                                  </p:stCondLst>
+                                  <p:childTnLst>
+                                    <p:set>
+                                      <p:cBhvr>
+                                        <p:cTn id="6" dur="1" fill="hold">
+                                          <p:stCondLst>
+                                            <p:cond delay="0"/>
+                                          </p:stCondLst>
+                                        </p:cTn>
+                                        <p:tgtEl>
+                                          <p:spTgt spid="9">
+                                            <p:txEl>
+                                              <p:pRg st="4" end="4"/>
+                                            </p:txEl>
+                                          </p:spTgt>
+                                        </p:tgtEl>
+                                        <p:attrNameLst>
+                                          <p:attrName>style.visibility</p:attrName>
+                                        </p:attrNameLst>
+                                      </p:cBhvr>
+                                      <p:to>
+                                        <p:strVal val="visible"/>
+                                      </p:to>
+                                    </p:set>
+                                  </p:childTnLst>
+                                </p:cTn>
+                              </p:par>
+                            </p:childTnLst>
+                          </p:cTn>
+                        </p:par>
+                      </p:childTnLst>
+                    </p:cTn>
+                  </p:par>
+                  <p:par>
+                    <p:cTn id="7" fill="hold">
+                      <p:stCondLst>
+                        <p:cond delay="indefinite"/>
+                      </p:stCondLst>
+                      <p:childTnLst>
+                        <p:par>
+                          <p:cTn id="8" fill="hold">
+                            <p:stCondLst>
+                              <p:cond delay="0"/>
+                            </p:stCondLst>
+                            <p:childTnLst>
+                              <p:par>
+                                <p:cTn id="9" presetID="1" presetClass="entr" presetSubtype="0" fill="hold" nodeType="clickEffect">
+                                  <p:stCondLst>
+                                    <p:cond delay="0"/>
+                                  </p:stCondLst>
+                                  <p:childTnLst>
+                                    <p:set>
+                                      <p:cBhvr>
+                                        <p:cTn id="10" dur="1" fill="hold">
+                                          <p:stCondLst>
+                                            <p:cond delay="0"/>
+                                          </p:stCondLst>
+                                        </p:cTn>
+                                        <p:tgtEl>
+                                          <p:spTgt spid="9">
+                                            <p:txEl>
+                                              <p:pRg st="6" end="6"/>
+                                            </p:txEl>
+                                          </p:spTgt>
+                                        </p:tgtEl>
+                                        <p:attrNameLst>
+                                          <p:attrName>style.visibility</p:attrName>
+                                        </p:attrNameLst>
+                                      </p:cBhvr>
+                                      <p:to>
+                                        <p:strVal val="visible"/>
+                                      </p:to>
+                                    </p:set>
+                                  </p:childTnLst>
+                                </p:cTn>
+                              </p:par>
+                            </p:childTnLst>
+                          </p:cTn>
+                        </p:par>
+                      </p:childTnLst>
+                    </p:cTn>
+                  </p:par>
+                </p:childTnLst>
+              </p:cTn>
+              <p:prevCondLst>
+                <p:cond evt="onPrev" delay="0">
+                  <p:tgtEl>
+                    <p:sldTgt/>
+                  </p:tgtEl>
+                </p:cond>
+              </p:prevCondLst>
+              <p:nextCondLst>
+                <p:cond evt="onNext" delay="0">
+                  <p:tgtEl>
+                    <p:sldTgt/>
+                  </p:tgtEl>
+                </p:cond>
+              </p:nextCondLst>
+            </p:seq>
+          </p:childTnLst>
+        </p:cTn>
+      </p:par>
+    </p:tnLst>
+  </p:timing>
+</p:sld>
+</file>
+
+<file path=ppt/slides/slide11.xml><?xml version="1.0" encoding="utf-8"?>
+<p:sld xmlns:a="http://schemas.openxmlformats.org/drawingml/2006/main" xmlns:r="http://schemas.openxmlformats.org/officeDocument/2006/relationships" xmlns:p="http://schemas.openxmlformats.org/presentationml/2006/main">
+  <p:cSld>
+    <p:spTree>
+      <p:nvGrpSpPr>
+        <p:cNvPr id="1" name="">
+          <a:extLst>
+            <a:ext uri="{FF2B5EF4-FFF2-40B4-BE49-F238E27FC236}">
+              <a16:creationId xmlns:a16="http://schemas.microsoft.com/office/drawing/2014/main" id="{49DDBB85-B27C-F170-D7A2-879EFDBE0C06}"/>
+            </a:ext>
+          </a:extLst>
+        </p:cNvPr>
+        <p:cNvGrpSpPr/>
+        <p:nvPr/>
+      </p:nvGrpSpPr>
+      <p:grpSpPr>
+        <a:xfrm>
+          <a:off x="0" y="0"/>
+          <a:ext cx="0" cy="0"/>
+          <a:chOff x="0" y="0"/>
+          <a:chExt cx="0" cy="0"/>
+        </a:xfrm>
+      </p:grpSpPr>
+      <p:sp>
+        <p:nvSpPr>
+          <p:cNvPr id="14338" name="Rectangle 2">
+            <a:extLst>
+              <a:ext uri="{FF2B5EF4-FFF2-40B4-BE49-F238E27FC236}">
+                <a16:creationId xmlns:a16="http://schemas.microsoft.com/office/drawing/2014/main" id="{C6DF62DD-7169-E314-1A95-05DB818570F1}"/>
+              </a:ext>
+            </a:extLst>
+          </p:cNvPr>
+          <p:cNvSpPr>
+            <a:spLocks noGrp="1" noChangeArrowheads="1"/>
+          </p:cNvSpPr>
+          <p:nvPr>
+            <p:ph type="title"/>
+          </p:nvPr>
+        </p:nvSpPr>
+        <p:spPr>
+          <a:xfrm>
+            <a:off x="533400" y="381000"/>
+            <a:ext cx="8382000" cy="838200"/>
+          </a:xfrm>
+        </p:spPr>
+        <p:txBody>
+          <a:bodyPr>
+            <a:normAutofit/>
+          </a:bodyPr>
+          <a:lstStyle/>
+          <a:p>
+            <a:pPr eaLnBrk="1" hangingPunct="1"/>
+            <a:r>
+              <a:rPr lang="en-GB" sz="3600" dirty="0">
+                <a:solidFill>
+                  <a:srgbClr val="0000FF"/>
+                </a:solidFill>
+              </a:rPr>
+              <a:t>Pointer </a:t>
+            </a:r>
+            <a:r>
+              <a:rPr lang="en-GB" sz="3600" dirty="0" err="1">
+                <a:solidFill>
+                  <a:srgbClr val="0000FF"/>
+                </a:solidFill>
+              </a:rPr>
+              <a:t>Arithmetics</a:t>
+            </a:r>
+            <a:endParaRPr lang="en-GB" sz="3600" dirty="0">
+              <a:solidFill>
+                <a:srgbClr val="0000FF"/>
+              </a:solidFill>
+            </a:endParaRPr>
+          </a:p>
+        </p:txBody>
+      </p:sp>
+      <p:sp>
+        <p:nvSpPr>
+          <p:cNvPr id="9" name="Content Placeholder 5">
+            <a:extLst>
+              <a:ext uri="{FF2B5EF4-FFF2-40B4-BE49-F238E27FC236}">
+                <a16:creationId xmlns:a16="http://schemas.microsoft.com/office/drawing/2014/main" id="{269DAB42-C589-5BFA-8DDD-6B3F03E9F33D}"/>
+              </a:ext>
+            </a:extLst>
+          </p:cNvPr>
+          <p:cNvSpPr>
+            <a:spLocks noGrp="1"/>
+          </p:cNvSpPr>
+          <p:nvPr>
+            <p:ph idx="1"/>
+          </p:nvPr>
+        </p:nvSpPr>
+        <p:spPr>
+          <a:xfrm>
+            <a:off x="587375" y="1187450"/>
+            <a:ext cx="8292856" cy="5449656"/>
+          </a:xfrm>
+        </p:spPr>
+        <p:txBody>
+          <a:bodyPr>
+            <a:noAutofit/>
+          </a:bodyPr>
+          <a:lstStyle/>
+          <a:p>
+            <a:pPr marL="347663" indent="-347663">
+              <a:spcBef>
+                <a:spcPts val="600"/>
+              </a:spcBef>
+              <a:buClr>
+                <a:schemeClr val="tx1">
+                  <a:lumMod val="90000"/>
+                  <a:lumOff val="10000"/>
+                </a:schemeClr>
+              </a:buClr>
+              <a:buSzPct val="100000"/>
+              <a:buFont typeface="Wingdings" panose="05000000000000000000" pitchFamily="2" charset="2"/>
+              <a:buChar char="§"/>
+              <a:defRPr/>
+            </a:pPr>
+            <a:r>
+              <a:rPr lang="en-US" sz="2800" dirty="0"/>
+              <a:t>What is the result of </a:t>
+            </a:r>
+            <a:r>
+              <a:rPr lang="en-US" sz="2800" dirty="0" err="1"/>
+              <a:t>ptr</a:t>
+            </a:r>
+            <a:r>
+              <a:rPr lang="en-US" sz="2800" dirty="0"/>
+              <a:t> + 1?</a:t>
+            </a:r>
+          </a:p>
+          <a:p>
+            <a:pPr marL="347663" indent="-347663">
+              <a:spcBef>
+                <a:spcPts val="600"/>
+              </a:spcBef>
+              <a:buClr>
+                <a:schemeClr val="tx1">
+                  <a:lumMod val="90000"/>
+                  <a:lumOff val="10000"/>
+                </a:schemeClr>
+              </a:buClr>
+              <a:buSzPct val="100000"/>
+              <a:buFont typeface="Wingdings" panose="05000000000000000000" pitchFamily="2" charset="2"/>
+              <a:buChar char="§"/>
+              <a:defRPr/>
+            </a:pPr>
+            <a:endParaRPr lang="en-US" sz="2800" dirty="0"/>
+          </a:p>
+          <a:p>
+            <a:pPr marL="347663" indent="-347663">
+              <a:spcBef>
+                <a:spcPts val="600"/>
+              </a:spcBef>
+              <a:buClr>
+                <a:schemeClr val="tx1">
+                  <a:lumMod val="90000"/>
+                  <a:lumOff val="10000"/>
+                </a:schemeClr>
+              </a:buClr>
+              <a:buSzPct val="100000"/>
+              <a:buFont typeface="Wingdings" panose="05000000000000000000" pitchFamily="2" charset="2"/>
+              <a:buChar char="§"/>
+              <a:defRPr/>
+            </a:pPr>
+            <a:endParaRPr lang="en-US" sz="2800" dirty="0"/>
+          </a:p>
+          <a:p>
+            <a:pPr marL="0" indent="0">
+              <a:spcBef>
+                <a:spcPts val="600"/>
+              </a:spcBef>
+              <a:buClr>
+                <a:schemeClr val="tx1">
+                  <a:lumMod val="90000"/>
+                  <a:lumOff val="10000"/>
+                </a:schemeClr>
+              </a:buClr>
+              <a:buSzPct val="100000"/>
+              <a:buNone/>
+              <a:defRPr/>
+            </a:pPr>
+            <a:endParaRPr lang="en-US" dirty="0"/>
+          </a:p>
+          <a:p>
+            <a:pPr marL="347663" indent="-347663">
+              <a:spcBef>
+                <a:spcPts val="600"/>
+              </a:spcBef>
+              <a:buClr>
+                <a:schemeClr val="tx1">
+                  <a:lumMod val="90000"/>
+                  <a:lumOff val="10000"/>
+                </a:schemeClr>
+              </a:buClr>
+              <a:buSzPct val="100000"/>
+              <a:buFont typeface="Wingdings" panose="05000000000000000000" pitchFamily="2" charset="2"/>
+              <a:buChar char="§"/>
+              <a:defRPr/>
+            </a:pPr>
+            <a:r>
+              <a:rPr lang="en-US" dirty="0"/>
+              <a:t>Adding 1 to a pointer itself gives the address of </a:t>
+            </a:r>
+            <a:r>
+              <a:rPr lang="en-US" b="1" dirty="0"/>
+              <a:t>the size of the variable pointed to by the pointer</a:t>
+            </a:r>
+            <a:r>
+              <a:rPr lang="en-US" dirty="0"/>
+              <a:t>.</a:t>
+            </a:r>
+          </a:p>
+          <a:p>
+            <a:pPr marL="347663" indent="-347663">
+              <a:spcBef>
+                <a:spcPts val="600"/>
+              </a:spcBef>
+              <a:buClr>
+                <a:schemeClr val="tx1">
+                  <a:lumMod val="90000"/>
+                  <a:lumOff val="10000"/>
+                </a:schemeClr>
+              </a:buClr>
+              <a:buSzPct val="100000"/>
+              <a:buFont typeface="Wingdings" panose="05000000000000000000" pitchFamily="2" charset="2"/>
+              <a:buChar char="§"/>
+              <a:defRPr/>
+            </a:pPr>
+            <a:endParaRPr lang="en-US" dirty="0"/>
+          </a:p>
+          <a:p>
+            <a:pPr marL="347663" indent="-347663">
+              <a:spcBef>
+                <a:spcPts val="600"/>
+              </a:spcBef>
+              <a:buClr>
+                <a:schemeClr val="tx1">
+                  <a:lumMod val="90000"/>
+                  <a:lumOff val="10000"/>
+                </a:schemeClr>
+              </a:buClr>
+              <a:buSzPct val="100000"/>
+              <a:buFont typeface="Wingdings" panose="05000000000000000000" pitchFamily="2" charset="2"/>
+              <a:buChar char="§"/>
+              <a:defRPr/>
+            </a:pPr>
+            <a:r>
+              <a:rPr lang="en-US" dirty="0"/>
+              <a:t>If x is at location 1000 and a long variable takes up 8 bytes…</a:t>
+            </a:r>
+          </a:p>
+          <a:p>
+            <a:pPr marL="621983" lvl="1" indent="-347663">
+              <a:spcBef>
+                <a:spcPts val="600"/>
+              </a:spcBef>
+              <a:buClr>
+                <a:schemeClr val="tx1">
+                  <a:lumMod val="90000"/>
+                  <a:lumOff val="10000"/>
+                </a:schemeClr>
+              </a:buClr>
+              <a:buSzPct val="100000"/>
+              <a:buFont typeface="Wingdings" panose="05000000000000000000" pitchFamily="2" charset="2"/>
+              <a:buChar char="§"/>
+              <a:defRPr/>
+            </a:pPr>
+            <a:r>
+              <a:rPr lang="en-US" dirty="0" err="1"/>
+              <a:t>ptr</a:t>
+            </a:r>
+            <a:r>
+              <a:rPr lang="en-US" dirty="0"/>
+              <a:t> is 1000.</a:t>
+            </a:r>
+          </a:p>
+          <a:p>
+            <a:pPr marL="621983" lvl="1" indent="-347663">
+              <a:spcBef>
+                <a:spcPts val="600"/>
+              </a:spcBef>
+              <a:buClr>
+                <a:schemeClr val="tx1">
+                  <a:lumMod val="90000"/>
+                  <a:lumOff val="10000"/>
+                </a:schemeClr>
+              </a:buClr>
+              <a:buSzPct val="100000"/>
+              <a:buFont typeface="Wingdings" panose="05000000000000000000" pitchFamily="2" charset="2"/>
+              <a:buChar char="§"/>
+              <a:defRPr/>
+            </a:pPr>
+            <a:r>
+              <a:rPr lang="en-US" dirty="0" err="1"/>
+              <a:t>ptr</a:t>
+            </a:r>
+            <a:r>
+              <a:rPr lang="en-US" dirty="0"/>
+              <a:t> + 1 is 1008.</a:t>
+            </a:r>
+          </a:p>
+          <a:p>
+            <a:pPr marL="347663" indent="-347663">
+              <a:spcBef>
+                <a:spcPts val="600"/>
+              </a:spcBef>
+              <a:buClr>
+                <a:schemeClr val="tx1">
+                  <a:lumMod val="90000"/>
+                  <a:lumOff val="10000"/>
+                </a:schemeClr>
+              </a:buClr>
+              <a:buSzPct val="100000"/>
+              <a:buFont typeface="Wingdings" panose="05000000000000000000" pitchFamily="2" charset="2"/>
+              <a:buChar char="§"/>
+              <a:defRPr/>
+            </a:pPr>
+            <a:endParaRPr lang="en-US" dirty="0"/>
+          </a:p>
+        </p:txBody>
+      </p:sp>
+      <p:sp>
+        <p:nvSpPr>
+          <p:cNvPr id="16" name="TextBox 15">
+            <a:extLst>
+              <a:ext uri="{FF2B5EF4-FFF2-40B4-BE49-F238E27FC236}">
+                <a16:creationId xmlns:a16="http://schemas.microsoft.com/office/drawing/2014/main" id="{DCB50687-8FE7-30D5-C6A9-B6DE22876A1A}"/>
+              </a:ext>
+            </a:extLst>
+          </p:cNvPr>
+          <p:cNvSpPr txBox="1"/>
+          <p:nvPr/>
+        </p:nvSpPr>
+        <p:spPr>
+          <a:xfrm>
+            <a:off x="1083396" y="1795579"/>
+            <a:ext cx="1671379" cy="1200329"/>
+          </a:xfrm>
+          <a:prstGeom prst="rect">
+            <a:avLst/>
+          </a:prstGeom>
+          <a:solidFill>
+            <a:schemeClr val="bg1"/>
+          </a:solidFill>
+          <a:ln w="19050">
+            <a:solidFill>
+              <a:schemeClr val="tx1"/>
+            </a:solidFill>
+          </a:ln>
+        </p:spPr>
+        <p:style>
+          <a:lnRef idx="2">
+            <a:schemeClr val="accent6"/>
+          </a:lnRef>
+          <a:fillRef idx="1">
+            <a:schemeClr val="lt1"/>
+          </a:fillRef>
+          <a:effectRef idx="0">
+            <a:schemeClr val="accent6"/>
+          </a:effectRef>
+          <a:fontRef idx="minor">
+            <a:schemeClr val="dk1"/>
+          </a:fontRef>
+        </p:style>
+        <p:txBody>
+          <a:bodyPr wrap="square" lIns="91440" tIns="45720" rIns="91440" bIns="45720" rtlCol="0" anchor="t">
+            <a:spAutoFit/>
+          </a:bodyPr>
+          <a:lstStyle/>
+          <a:p>
+            <a:pPr>
+              <a:tabLst>
+                <a:tab pos="347663" algn="l"/>
+                <a:tab pos="682625" algn="l"/>
+                <a:tab pos="1087438" algn="l"/>
+                <a:tab pos="1377950" algn="l"/>
+                <a:tab pos="1712913" algn="l"/>
+              </a:tabLst>
+            </a:pPr>
+            <a:r>
+              <a:rPr lang="en-US" b="1" dirty="0">
+                <a:solidFill>
+                  <a:srgbClr val="0000FF"/>
+                </a:solidFill>
+                <a:latin typeface="Courier New" panose="02070309020205020404" pitchFamily="49" charset="0"/>
+                <a:cs typeface="Courier New" panose="02070309020205020404" pitchFamily="49" charset="0"/>
+              </a:rPr>
+              <a:t>long</a:t>
+            </a:r>
+            <a:r>
+              <a:rPr lang="en-US" b="1" dirty="0">
+                <a:solidFill>
+                  <a:schemeClr val="tx1"/>
+                </a:solidFill>
+                <a:latin typeface="Courier New" panose="02070309020205020404" pitchFamily="49" charset="0"/>
+                <a:cs typeface="Courier New" panose="02070309020205020404" pitchFamily="49" charset="0"/>
+              </a:rPr>
+              <a:t> x;</a:t>
+            </a:r>
+          </a:p>
+          <a:p>
+            <a:pPr>
+              <a:tabLst>
+                <a:tab pos="347663" algn="l"/>
+                <a:tab pos="682625" algn="l"/>
+                <a:tab pos="1087438" algn="l"/>
+                <a:tab pos="1377950" algn="l"/>
+                <a:tab pos="1712913" algn="l"/>
+              </a:tabLst>
+            </a:pPr>
+            <a:r>
+              <a:rPr lang="en-US" b="1" dirty="0">
+                <a:solidFill>
+                  <a:srgbClr val="0000FF"/>
+                </a:solidFill>
+                <a:latin typeface="Courier New" panose="02070309020205020404" pitchFamily="49" charset="0"/>
+                <a:cs typeface="Courier New" panose="02070309020205020404" pitchFamily="49" charset="0"/>
+              </a:rPr>
+              <a:t>long</a:t>
+            </a:r>
+            <a:r>
+              <a:rPr lang="en-US" b="1" dirty="0">
+                <a:solidFill>
+                  <a:schemeClr val="tx1"/>
+                </a:solidFill>
+                <a:latin typeface="Courier New" panose="02070309020205020404" pitchFamily="49" charset="0"/>
+                <a:cs typeface="Courier New" panose="02070309020205020404" pitchFamily="49" charset="0"/>
+              </a:rPr>
+              <a:t> *</a:t>
+            </a:r>
+            <a:r>
+              <a:rPr lang="en-US" b="1" dirty="0" err="1">
+                <a:solidFill>
+                  <a:schemeClr val="tx1"/>
+                </a:solidFill>
+                <a:latin typeface="Courier New" panose="02070309020205020404" pitchFamily="49" charset="0"/>
+                <a:cs typeface="Courier New" panose="02070309020205020404" pitchFamily="49" charset="0"/>
+              </a:rPr>
+              <a:t>ptr</a:t>
+            </a:r>
+            <a:r>
+              <a:rPr lang="en-US" b="1" dirty="0">
+                <a:solidFill>
+                  <a:schemeClr val="tx1"/>
+                </a:solidFill>
+                <a:latin typeface="Courier New" panose="02070309020205020404" pitchFamily="49" charset="0"/>
+                <a:cs typeface="Courier New" panose="02070309020205020404" pitchFamily="49" charset="0"/>
+              </a:rPr>
+              <a:t>;</a:t>
+            </a:r>
+          </a:p>
+          <a:p>
+            <a:pPr>
+              <a:tabLst>
+                <a:tab pos="347663" algn="l"/>
+                <a:tab pos="682625" algn="l"/>
+                <a:tab pos="1087438" algn="l"/>
+                <a:tab pos="1377950" algn="l"/>
+                <a:tab pos="1712913" algn="l"/>
+              </a:tabLst>
+            </a:pPr>
+            <a:r>
+              <a:rPr lang="en-US" b="1" dirty="0">
+                <a:solidFill>
+                  <a:schemeClr val="tx1"/>
+                </a:solidFill>
+                <a:latin typeface="Courier New" panose="02070309020205020404" pitchFamily="49" charset="0"/>
+                <a:cs typeface="Courier New" panose="02070309020205020404" pitchFamily="49" charset="0"/>
+              </a:rPr>
+              <a:t>x = </a:t>
+            </a:r>
+            <a:r>
+              <a:rPr lang="en-US" b="1" dirty="0">
+                <a:solidFill>
+                  <a:srgbClr val="C00000"/>
+                </a:solidFill>
+                <a:latin typeface="Courier New" panose="02070309020205020404" pitchFamily="49" charset="0"/>
+                <a:cs typeface="Courier New" panose="02070309020205020404" pitchFamily="49" charset="0"/>
+              </a:rPr>
+              <a:t>1</a:t>
+            </a:r>
+            <a:r>
+              <a:rPr lang="en-US" b="1" dirty="0">
+                <a:solidFill>
+                  <a:schemeClr val="tx1"/>
+                </a:solidFill>
+                <a:latin typeface="Courier New" panose="02070309020205020404" pitchFamily="49" charset="0"/>
+                <a:cs typeface="Courier New" panose="02070309020205020404" pitchFamily="49" charset="0"/>
+              </a:rPr>
+              <a:t>;</a:t>
+            </a:r>
+          </a:p>
+          <a:p>
+            <a:pPr>
+              <a:tabLst>
+                <a:tab pos="347663" algn="l"/>
+                <a:tab pos="682625" algn="l"/>
+                <a:tab pos="1087438" algn="l"/>
+                <a:tab pos="1377950" algn="l"/>
+                <a:tab pos="1712913" algn="l"/>
+              </a:tabLst>
+            </a:pPr>
+            <a:r>
+              <a:rPr lang="en-US" b="1" dirty="0" err="1">
+                <a:solidFill>
+                  <a:schemeClr val="tx1"/>
+                </a:solidFill>
+                <a:latin typeface="Courier New" panose="02070309020205020404" pitchFamily="49" charset="0"/>
+                <a:cs typeface="Courier New" panose="02070309020205020404" pitchFamily="49" charset="0"/>
+              </a:rPr>
+              <a:t>ptr</a:t>
+            </a:r>
+            <a:r>
+              <a:rPr lang="en-US" b="1" dirty="0">
+                <a:solidFill>
+                  <a:schemeClr val="tx1"/>
+                </a:solidFill>
+                <a:latin typeface="Courier New" panose="02070309020205020404" pitchFamily="49" charset="0"/>
+                <a:cs typeface="Courier New" panose="02070309020205020404" pitchFamily="49" charset="0"/>
+              </a:rPr>
+              <a:t> = &amp;x;</a:t>
+            </a:r>
+          </a:p>
+        </p:txBody>
+      </p:sp>
+      <p:sp>
+        <p:nvSpPr>
+          <p:cNvPr id="2" name="Footer Placeholder 1">
+            <a:extLst>
+              <a:ext uri="{FF2B5EF4-FFF2-40B4-BE49-F238E27FC236}">
+                <a16:creationId xmlns:a16="http://schemas.microsoft.com/office/drawing/2014/main" id="{082C5566-521B-CEDE-F75B-D1B29AAA47A2}"/>
+              </a:ext>
+            </a:extLst>
+          </p:cNvPr>
+          <p:cNvSpPr>
+            <a:spLocks noGrp="1"/>
+          </p:cNvSpPr>
+          <p:nvPr>
+            <p:ph type="ftr" sz="quarter" idx="11"/>
+          </p:nvPr>
+        </p:nvSpPr>
+        <p:spPr/>
+        <p:txBody>
+          <a:bodyPr/>
+          <a:lstStyle/>
+          <a:p>
+            <a:pPr algn="l">
+              <a:defRPr/>
+            </a:pPr>
+            <a:r>
+              <a:rPr lang="en-US"/>
+              <a:t>CS1010 (AY2023/24 Semester 2)</a:t>
+            </a:r>
+            <a:endParaRPr lang="en-US" dirty="0"/>
+          </a:p>
+        </p:txBody>
+      </p:sp>
+      <p:sp>
+        <p:nvSpPr>
+          <p:cNvPr id="3" name="Slide Number Placeholder 2">
+            <a:extLst>
+              <a:ext uri="{FF2B5EF4-FFF2-40B4-BE49-F238E27FC236}">
+                <a16:creationId xmlns:a16="http://schemas.microsoft.com/office/drawing/2014/main" id="{C30265C9-AB1E-63E8-FC76-08F5CDE1E362}"/>
+              </a:ext>
+            </a:extLst>
+          </p:cNvPr>
+          <p:cNvSpPr>
+            <a:spLocks noGrp="1"/>
+          </p:cNvSpPr>
+          <p:nvPr>
+            <p:ph type="sldNum" sz="quarter" idx="12"/>
+          </p:nvPr>
+        </p:nvSpPr>
+        <p:spPr/>
+        <p:txBody>
+          <a:bodyPr/>
+          <a:lstStyle/>
+          <a:p>
+            <a:pPr>
+              <a:defRPr/>
+            </a:pPr>
+            <a:r>
+              <a:rPr lang="en-US" dirty="0"/>
+              <a:t>Unit15 - </a:t>
+            </a:r>
+            <a:fld id="{2E4790E1-2590-4AEE-892D-AB46A7688113}" type="slidenum">
+              <a:rPr lang="en-US" smtClean="0"/>
+              <a:pPr>
+                <a:defRPr/>
+              </a:pPr>
+              <a:t>11</a:t>
+            </a:fld>
+            <a:endParaRPr lang="en-US" dirty="0"/>
+          </a:p>
+        </p:txBody>
+      </p:sp>
+    </p:spTree>
+    <p:extLst>
+      <p:ext uri="{BB962C8B-B14F-4D97-AF65-F5344CB8AC3E}">
+        <p14:creationId xmlns:p14="http://schemas.microsoft.com/office/powerpoint/2010/main" val="190401359"/>
       </p:ext>
     </p:extLst>
   </p:cSld>
@@ -15293,7 +16224,7 @@
 </p:sld>
 </file>
 
-<file path=ppt/slides/slide11.xml><?xml version="1.0" encoding="utf-8"?>
+<file path=ppt/slides/slide12.xml><?xml version="1.0" encoding="utf-8"?>
 <p:sld xmlns:a="http://schemas.openxmlformats.org/drawingml/2006/main" xmlns:r="http://schemas.openxmlformats.org/officeDocument/2006/relationships" xmlns:p="http://schemas.openxmlformats.org/presentationml/2006/main">
   <p:cSld>
     <p:spTree>
@@ -15947,7 +16878,7 @@
               <a:pPr>
                 <a:defRPr/>
               </a:pPr>
-              <a:t>11</a:t>
+              <a:t>12</a:t>
             </a:fld>
             <a:endParaRPr lang="en-US" dirty="0"/>
           </a:p>
@@ -16354,7 +17285,7 @@
             </a:pPr>
             <a:r>
               <a:rPr lang="en-US" dirty="0"/>
-              <a:t>Can be used to store 1 byte of data</a:t>
+              <a:t>Can be used to store 1 byte (i.e., 8 bits) of data</a:t>
             </a:r>
           </a:p>
           <a:p>
@@ -16441,7 +17372,7 @@
         </p:nvSpPr>
         <p:spPr>
           <a:xfrm>
-            <a:off x="6466917" y="3931115"/>
+            <a:off x="6222474" y="4664447"/>
             <a:ext cx="2413314" cy="646331"/>
           </a:xfrm>
           <a:prstGeom prst="rect">
@@ -16577,7 +17508,7 @@
         </p:blipFill>
         <p:spPr>
           <a:xfrm>
-            <a:off x="2507810" y="2879008"/>
+            <a:off x="2263367" y="3612340"/>
             <a:ext cx="3391357" cy="444742"/>
           </a:xfrm>
           <a:prstGeom prst="rect">
@@ -16601,7 +17532,7 @@
         </p:nvCxnSpPr>
         <p:spPr>
           <a:xfrm flipH="1" flipV="1">
-            <a:off x="5263350" y="3117760"/>
+            <a:off x="5018907" y="3851092"/>
             <a:ext cx="1203567" cy="1275020"/>
           </a:xfrm>
           <a:prstGeom prst="straightConnector1">
@@ -16645,7 +17576,7 @@
         </p:nvCxnSpPr>
         <p:spPr>
           <a:xfrm flipV="1">
-            <a:off x="1940060" y="3098525"/>
+            <a:off x="1695617" y="3831857"/>
             <a:ext cx="932507" cy="552338"/>
           </a:xfrm>
           <a:prstGeom prst="straightConnector1">
@@ -16689,7 +17620,7 @@
         </p:nvCxnSpPr>
         <p:spPr>
           <a:xfrm flipV="1">
-            <a:off x="3561312" y="3115449"/>
+            <a:off x="3316869" y="3848781"/>
             <a:ext cx="932507" cy="552338"/>
           </a:xfrm>
           <a:prstGeom prst="straightConnector1">
@@ -16731,7 +17662,7 @@
         </p:nvSpPr>
         <p:spPr>
           <a:xfrm>
-            <a:off x="1402709" y="3698689"/>
+            <a:off x="1158266" y="4432021"/>
             <a:ext cx="1318506" cy="369332"/>
           </a:xfrm>
           <a:prstGeom prst="rect">
@@ -16772,7 +17703,7 @@
         </p:nvSpPr>
         <p:spPr>
           <a:xfrm>
-            <a:off x="3061721" y="3719562"/>
+            <a:off x="2817278" y="4452894"/>
             <a:ext cx="1318506" cy="369332"/>
           </a:xfrm>
           <a:prstGeom prst="rect">
@@ -16813,7 +17744,7 @@
         </p:nvSpPr>
         <p:spPr>
           <a:xfrm>
-            <a:off x="2092540" y="2862786"/>
+            <a:off x="1848097" y="3596118"/>
             <a:ext cx="742384" cy="369332"/>
           </a:xfrm>
           <a:prstGeom prst="rect">
@@ -16849,7 +17780,7 @@
         </p:nvSpPr>
         <p:spPr>
           <a:xfrm>
-            <a:off x="5859457" y="2871487"/>
+            <a:off x="5615014" y="3604819"/>
             <a:ext cx="742384" cy="369332"/>
           </a:xfrm>
           <a:prstGeom prst="rect">
@@ -16866,6 +17797,90 @@
             <a:r>
               <a:rPr lang="en-US" dirty="0"/>
               <a:t>…</a:t>
+            </a:r>
+            <a:endParaRPr lang="en-SG" dirty="0"/>
+          </a:p>
+        </p:txBody>
+      </p:sp>
+      <p:pic>
+        <p:nvPicPr>
+          <p:cNvPr id="3" name="Picture 2" descr="A close-up of several computer chips&#10;&#10;Description automatically generated">
+            <a:extLst>
+              <a:ext uri="{FF2B5EF4-FFF2-40B4-BE49-F238E27FC236}">
+                <a16:creationId xmlns:a16="http://schemas.microsoft.com/office/drawing/2014/main" id="{AE5F8B66-A536-5EF0-E189-60C87A7FD2DB}"/>
+              </a:ext>
+            </a:extLst>
+          </p:cNvPr>
+          <p:cNvPicPr>
+            <a:picLocks noChangeAspect="1"/>
+          </p:cNvPicPr>
+          <p:nvPr/>
+        </p:nvPicPr>
+        <p:blipFill>
+          <a:blip r:embed="rId4">
+            <a:extLst>
+              <a:ext uri="{28A0092B-C50C-407E-A947-70E740481C1C}">
+                <a14:useLocalDpi xmlns:a14="http://schemas.microsoft.com/office/drawing/2010/main" val="0"/>
+              </a:ext>
+            </a:extLst>
+          </a:blip>
+          <a:stretch>
+            <a:fillRect/>
+          </a:stretch>
+        </p:blipFill>
+        <p:spPr>
+          <a:xfrm>
+            <a:off x="6948185" y="1236878"/>
+            <a:ext cx="1905000" cy="1819275"/>
+          </a:xfrm>
+          <a:prstGeom prst="rect">
+            <a:avLst/>
+          </a:prstGeom>
+        </p:spPr>
+      </p:pic>
+      <p:sp>
+        <p:nvSpPr>
+          <p:cNvPr id="13" name="Speech Bubble: Oval 12">
+            <a:extLst>
+              <a:ext uri="{FF2B5EF4-FFF2-40B4-BE49-F238E27FC236}">
+                <a16:creationId xmlns:a16="http://schemas.microsoft.com/office/drawing/2014/main" id="{FC077A5E-41FC-9410-4B41-47E92F472305}"/>
+              </a:ext>
+            </a:extLst>
+          </p:cNvPr>
+          <p:cNvSpPr/>
+          <p:nvPr/>
+        </p:nvSpPr>
+        <p:spPr>
+          <a:xfrm>
+            <a:off x="2536409" y="2906162"/>
+            <a:ext cx="1712967" cy="587957"/>
+          </a:xfrm>
+          <a:prstGeom prst="wedgeEllipseCallout">
+            <a:avLst/>
+          </a:prstGeom>
+        </p:spPr>
+        <p:style>
+          <a:lnRef idx="2">
+            <a:schemeClr val="accent1"/>
+          </a:lnRef>
+          <a:fillRef idx="1">
+            <a:schemeClr val="lt1"/>
+          </a:fillRef>
+          <a:effectRef idx="0">
+            <a:schemeClr val="accent1"/>
+          </a:effectRef>
+          <a:fontRef idx="minor">
+            <a:schemeClr val="dk1"/>
+          </a:fontRef>
+        </p:style>
+        <p:txBody>
+          <a:bodyPr rtlCol="0" anchor="ctr"/>
+          <a:lstStyle/>
+          <a:p>
+            <a:pPr algn="ctr"/>
+            <a:r>
+              <a:rPr lang="en-US" dirty="0"/>
+              <a:t>10001011</a:t>
             </a:r>
             <a:endParaRPr lang="en-SG" dirty="0"/>
           </a:p>
@@ -16905,7 +17920,7 @@
                             </p:stCondLst>
                             <p:childTnLst>
                               <p:par>
-                                <p:cTn id="5" presetID="1" presetClass="entr" presetSubtype="0" fill="hold" grpId="0" nodeType="clickEffect">
+                                <p:cTn id="5" presetID="1" presetClass="entr" presetSubtype="0" fill="hold" nodeType="clickEffect">
                                   <p:stCondLst>
                                     <p:cond delay="0"/>
                                   </p:stCondLst>
@@ -16918,7 +17933,88 @@
                                           </p:stCondLst>
                                         </p:cTn>
                                         <p:tgtEl>
-                                          <p:spTgt spid="15"/>
+                                          <p:spTgt spid="11"/>
+                                        </p:tgtEl>
+                                        <p:attrNameLst>
+                                          <p:attrName>style.visibility</p:attrName>
+                                        </p:attrNameLst>
+                                      </p:cBhvr>
+                                      <p:to>
+                                        <p:strVal val="visible"/>
+                                      </p:to>
+                                    </p:set>
+                                  </p:childTnLst>
+                                </p:cTn>
+                              </p:par>
+                              <p:par>
+                                <p:cTn id="7" presetID="1" presetClass="entr" presetSubtype="0" fill="hold" nodeType="withEffect">
+                                  <p:stCondLst>
+                                    <p:cond delay="0"/>
+                                  </p:stCondLst>
+                                  <p:childTnLst>
+                                    <p:set>
+                                      <p:cBhvr>
+                                        <p:cTn id="8" dur="1" fill="hold">
+                                          <p:stCondLst>
+                                            <p:cond delay="0"/>
+                                          </p:stCondLst>
+                                        </p:cTn>
+                                        <p:tgtEl>
+                                          <p:spTgt spid="19"/>
+                                        </p:tgtEl>
+                                        <p:attrNameLst>
+                                          <p:attrName>style.visibility</p:attrName>
+                                        </p:attrNameLst>
+                                      </p:cBhvr>
+                                      <p:to>
+                                        <p:strVal val="visible"/>
+                                      </p:to>
+                                    </p:set>
+                                  </p:childTnLst>
+                                </p:cTn>
+                              </p:par>
+                              <p:par>
+                                <p:cTn id="9" presetID="1" presetClass="entr" presetSubtype="0" fill="hold" grpId="0" nodeType="withEffect">
+                                  <p:stCondLst>
+                                    <p:cond delay="0"/>
+                                  </p:stCondLst>
+                                  <p:childTnLst>
+                                    <p:set>
+                                      <p:cBhvr>
+                                        <p:cTn id="10" dur="1" fill="hold">
+                                          <p:stCondLst>
+                                            <p:cond delay="0"/>
+                                          </p:stCondLst>
+                                        </p:cTn>
+                                        <p:tgtEl>
+                                          <p:spTgt spid="22"/>
+                                        </p:tgtEl>
+                                        <p:attrNameLst>
+                                          <p:attrName>style.visibility</p:attrName>
+                                        </p:attrNameLst>
+                                      </p:cBhvr>
+                                      <p:to>
+                                        <p:strVal val="visible"/>
+                                      </p:to>
+                                    </p:set>
+                                  </p:childTnLst>
+                                </p:cTn>
+                              </p:par>
+                              <p:par>
+                                <p:cTn id="11" presetID="1" presetClass="entr" presetSubtype="0" fill="hold" grpId="0" nodeType="withEffect">
+                                  <p:stCondLst>
+                                    <p:cond delay="0"/>
+                                  </p:stCondLst>
+                                  <p:childTnLst>
+                                    <p:set>
+                                      <p:cBhvr>
+                                        <p:cTn id="12" dur="1" fill="hold">
+                                          <p:stCondLst>
+                                            <p:cond delay="0"/>
+                                          </p:stCondLst>
+                                        </p:cTn>
+                                        <p:tgtEl>
+                                          <p:spTgt spid="21"/>
                                         </p:tgtEl>
                                         <p:attrNameLst>
                                           <p:attrName>style.visibility</p:attrName>
@@ -16938,26 +18034,26 @@
                     </p:cTn>
                   </p:par>
                   <p:par>
-                    <p:cTn id="7" fill="hold">
+                    <p:cTn id="13" fill="hold">
                       <p:stCondLst>
                         <p:cond delay="indefinite"/>
                       </p:stCondLst>
                       <p:childTnLst>
                         <p:par>
-                          <p:cTn id="8" fill="hold">
+                          <p:cTn id="14" fill="hold">
                             <p:stCondLst>
                               <p:cond delay="0"/>
                             </p:stCondLst>
                             <p:childTnLst>
                               <p:par>
-                                <p:cTn id="9" presetID="1" presetClass="entr" presetSubtype="0" fill="hold" grpId="1" nodeType="clickEffect">
+                                <p:cTn id="15" presetID="1" presetClass="entr" presetSubtype="0" fill="hold" grpId="0" nodeType="clickEffect">
                                   <p:stCondLst>
                                     <p:cond delay="0"/>
                                   </p:stCondLst>
                                   <p:childTnLst>
                                     <p:set>
                                       <p:cBhvr>
-                                        <p:cTn id="10" dur="1" fill="hold">
+                                        <p:cTn id="16" dur="1" fill="hold">
                                           <p:stCondLst>
                                             <p:cond delay="0"/>
                                           </p:stCondLst>
@@ -16977,74 +18073,20 @@
                                 </p:cTn>
                               </p:par>
                               <p:par>
-                                <p:cTn id="11" presetID="1" presetClass="entr" presetSubtype="0" fill="hold" nodeType="withEffect">
+                                <p:cTn id="17" presetID="1" presetClass="entr" presetSubtype="0" fill="hold" nodeType="withEffect">
                                   <p:stCondLst>
                                     <p:cond delay="0"/>
                                   </p:stCondLst>
                                   <p:childTnLst>
                                     <p:set>
                                       <p:cBhvr>
-                                        <p:cTn id="12" dur="1" fill="hold">
+                                        <p:cTn id="18" dur="1" fill="hold">
                                           <p:stCondLst>
                                             <p:cond delay="0"/>
                                           </p:stCondLst>
                                         </p:cTn>
                                         <p:tgtEl>
                                           <p:spTgt spid="14"/>
-                                        </p:tgtEl>
-                                        <p:attrNameLst>
-                                          <p:attrName>style.visibility</p:attrName>
-                                        </p:attrNameLst>
-                                      </p:cBhvr>
-                                      <p:to>
-                                        <p:strVal val="visible"/>
-                                      </p:to>
-                                    </p:set>
-                                  </p:childTnLst>
-                                </p:cTn>
-                              </p:par>
-                              <p:par>
-                                <p:cTn id="13" presetID="1" presetClass="entr" presetSubtype="0" fill="hold" nodeType="withEffect">
-                                  <p:stCondLst>
-                                    <p:cond delay="0"/>
-                                  </p:stCondLst>
-                                  <p:childTnLst>
-                                    <p:set>
-                                      <p:cBhvr>
-                                        <p:cTn id="14" dur="1" fill="hold">
-                                          <p:stCondLst>
-                                            <p:cond delay="0"/>
-                                          </p:stCondLst>
-                                        </p:cTn>
-                                        <p:tgtEl>
-                                          <p:spTgt spid="11"/>
-                                        </p:tgtEl>
-                                        <p:attrNameLst>
-                                          <p:attrName>style.visibility</p:attrName>
-                                        </p:attrNameLst>
-                                      </p:cBhvr>
-                                      <p:to>
-                                        <p:strVal val="visible"/>
-                                      </p:to>
-                                    </p:set>
-                                  </p:childTnLst>
-                                </p:cTn>
-                              </p:par>
-                              <p:par>
-                                <p:cTn id="15" presetID="1" presetClass="entr" presetSubtype="0" fill="hold" nodeType="withEffect">
-                                  <p:stCondLst>
-                                    <p:cond delay="0"/>
-                                  </p:stCondLst>
-                                  <p:childTnLst>
-                                    <p:set>
-                                      <p:cBhvr>
-                                        <p:cTn id="16" dur="1" fill="hold">
-                                          <p:stCondLst>
-                                            <p:cond delay="0"/>
-                                          </p:stCondLst>
-                                        </p:cTn>
-                                        <p:tgtEl>
-                                          <p:spTgt spid="19"/>
                                         </p:tgtEl>
                                         <p:attrNameLst>
                                           <p:attrName>style.visibility</p:attrName>
@@ -17086,7 +18128,8 @@
     </p:tnLst>
     <p:bldLst>
       <p:bldP spid="15" grpId="0" animBg="1"/>
-      <p:bldP spid="15" grpId="1" animBg="1"/>
+      <p:bldP spid="21" grpId="0"/>
+      <p:bldP spid="22" grpId="0"/>
     </p:bldLst>
   </p:timing>
 </p:sld>
@@ -19032,111 +20075,6 @@
   <p:transition>
     <p:fade/>
   </p:transition>
-  <p:timing>
-    <p:tnLst>
-      <p:par>
-        <p:cTn id="1" dur="indefinite" restart="never" nodeType="tmRoot">
-          <p:childTnLst>
-            <p:seq concurrent="1" nextAc="seek">
-              <p:cTn id="2" dur="indefinite" nodeType="mainSeq">
-                <p:childTnLst>
-                  <p:par>
-                    <p:cTn id="3" fill="hold">
-                      <p:stCondLst>
-                        <p:cond delay="indefinite"/>
-                        <p:cond evt="onBegin" delay="0">
-                          <p:tn val="2"/>
-                        </p:cond>
-                      </p:stCondLst>
-                      <p:childTnLst>
-                        <p:par>
-                          <p:cTn id="4" fill="hold">
-                            <p:stCondLst>
-                              <p:cond delay="0"/>
-                            </p:stCondLst>
-                            <p:childTnLst>
-                              <p:par>
-                                <p:cTn id="5" presetID="1" presetClass="entr" presetSubtype="0" fill="hold" nodeType="withEffect">
-                                  <p:stCondLst>
-                                    <p:cond delay="0"/>
-                                  </p:stCondLst>
-                                  <p:childTnLst>
-                                    <p:set>
-                                      <p:cBhvr>
-                                        <p:cTn id="6" dur="1" fill="hold">
-                                          <p:stCondLst>
-                                            <p:cond delay="0"/>
-                                          </p:stCondLst>
-                                        </p:cTn>
-                                        <p:tgtEl>
-                                          <p:spTgt spid="6"/>
-                                        </p:tgtEl>
-                                        <p:attrNameLst>
-                                          <p:attrName>style.visibility</p:attrName>
-                                        </p:attrNameLst>
-                                      </p:cBhvr>
-                                      <p:to>
-                                        <p:strVal val="visible"/>
-                                      </p:to>
-                                    </p:set>
-                                  </p:childTnLst>
-                                </p:cTn>
-                              </p:par>
-                              <p:par>
-                                <p:cTn id="7" presetID="1" presetClass="entr" presetSubtype="0" fill="hold" nodeType="withEffect">
-                                  <p:stCondLst>
-                                    <p:cond delay="0"/>
-                                  </p:stCondLst>
-                                  <p:childTnLst>
-                                    <p:set>
-                                      <p:cBhvr>
-                                        <p:cTn id="8" dur="1" fill="hold">
-                                          <p:stCondLst>
-                                            <p:cond delay="0"/>
-                                          </p:stCondLst>
-                                        </p:cTn>
-                                        <p:tgtEl>
-                                          <p:spTgt spid="9"/>
-                                        </p:tgtEl>
-                                        <p:attrNameLst>
-                                          <p:attrName>style.visibility</p:attrName>
-                                        </p:attrNameLst>
-                                      </p:cBhvr>
-                                      <p:to>
-                                        <p:strVal val="visible"/>
-                                      </p:to>
-                                    </p:set>
-                                  </p:childTnLst>
-                                </p:cTn>
-                              </p:par>
-                            </p:childTnLst>
-                          </p:cTn>
-                        </p:par>
-                      </p:childTnLst>
-                    </p:cTn>
-                  </p:par>
-                </p:childTnLst>
-              </p:cTn>
-              <p:prevCondLst>
-                <p:cond evt="onPrev" delay="0">
-                  <p:tgtEl>
-                    <p:sldTgt/>
-                  </p:tgtEl>
-                </p:cond>
-              </p:prevCondLst>
-              <p:nextCondLst>
-                <p:cond evt="onNext" delay="0">
-                  <p:tgtEl>
-                    <p:sldTgt/>
-                  </p:tgtEl>
-                </p:cond>
-              </p:nextCondLst>
-            </p:seq>
-          </p:childTnLst>
-        </p:cTn>
-      </p:par>
-    </p:tnLst>
-  </p:timing>
 </p:sld>
 </file>
 

</xml_diff>